<commit_message>
grosse mise à jour
créaction code case, bombe, map et moteur + création d'une carte
</commit_message>
<xml_diff>
--- a/doc/diagrammes.pptx
+++ b/doc/diagrammes.pptx
@@ -106,6 +106,22 @@
       </a:defRPr>
     </a:lvl9pPr>
   </p:defaultTextStyle>
+  <p:extLst>
+    <p:ext uri="{EFAFB233-063F-42B5-8137-9DF3F51BA10A}">
+      <p15:sldGuideLst xmlns:p15="http://schemas.microsoft.com/office/powerpoint/2012/main">
+        <p15:guide id="1" orient="horz" pos="2160">
+          <p15:clr>
+            <a:srgbClr val="A4A3A4"/>
+          </p15:clr>
+        </p15:guide>
+        <p15:guide id="2" pos="3840">
+          <p15:clr>
+            <a:srgbClr val="A4A3A4"/>
+          </p15:clr>
+        </p15:guide>
+      </p15:sldGuideLst>
+    </p:ext>
+  </p:extLst>
 </p:presentation>
 </file>
 
@@ -240,7 +256,7 @@
           <a:p>
             <a:fld id="{EF4EFFAA-60B0-4C50-B06F-B9907E49371C}" type="datetimeFigureOut">
               <a:rPr lang="fr-FR" smtClean="0"/>
-              <a:t>15/01/2015</a:t>
+              <a:t>20/01/2015</a:t>
             </a:fld>
             <a:endParaRPr lang="fr-FR"/>
           </a:p>
@@ -282,7 +298,7 @@
           <a:p>
             <a:fld id="{5B183991-99AC-48B7-9B64-76956455EBB2}" type="slidenum">
               <a:rPr lang="fr-FR" smtClean="0"/>
-              <a:t>‹#›</a:t>
+              <a:t>‹N°›</a:t>
             </a:fld>
             <a:endParaRPr lang="fr-FR"/>
           </a:p>
@@ -410,7 +426,7 @@
           <a:p>
             <a:fld id="{EF4EFFAA-60B0-4C50-B06F-B9907E49371C}" type="datetimeFigureOut">
               <a:rPr lang="fr-FR" smtClean="0"/>
-              <a:t>15/01/2015</a:t>
+              <a:t>20/01/2015</a:t>
             </a:fld>
             <a:endParaRPr lang="fr-FR"/>
           </a:p>
@@ -452,7 +468,7 @@
           <a:p>
             <a:fld id="{5B183991-99AC-48B7-9B64-76956455EBB2}" type="slidenum">
               <a:rPr lang="fr-FR" smtClean="0"/>
-              <a:t>‹#›</a:t>
+              <a:t>‹N°›</a:t>
             </a:fld>
             <a:endParaRPr lang="fr-FR"/>
           </a:p>
@@ -590,7 +606,7 @@
           <a:p>
             <a:fld id="{EF4EFFAA-60B0-4C50-B06F-B9907E49371C}" type="datetimeFigureOut">
               <a:rPr lang="fr-FR" smtClean="0"/>
-              <a:t>15/01/2015</a:t>
+              <a:t>20/01/2015</a:t>
             </a:fld>
             <a:endParaRPr lang="fr-FR"/>
           </a:p>
@@ -632,7 +648,7 @@
           <a:p>
             <a:fld id="{5B183991-99AC-48B7-9B64-76956455EBB2}" type="slidenum">
               <a:rPr lang="fr-FR" smtClean="0"/>
-              <a:t>‹#›</a:t>
+              <a:t>‹N°›</a:t>
             </a:fld>
             <a:endParaRPr lang="fr-FR"/>
           </a:p>
@@ -760,7 +776,7 @@
           <a:p>
             <a:fld id="{EF4EFFAA-60B0-4C50-B06F-B9907E49371C}" type="datetimeFigureOut">
               <a:rPr lang="fr-FR" smtClean="0"/>
-              <a:t>15/01/2015</a:t>
+              <a:t>20/01/2015</a:t>
             </a:fld>
             <a:endParaRPr lang="fr-FR"/>
           </a:p>
@@ -802,7 +818,7 @@
           <a:p>
             <a:fld id="{5B183991-99AC-48B7-9B64-76956455EBB2}" type="slidenum">
               <a:rPr lang="fr-FR" smtClean="0"/>
-              <a:t>‹#›</a:t>
+              <a:t>‹N°›</a:t>
             </a:fld>
             <a:endParaRPr lang="fr-FR"/>
           </a:p>
@@ -1006,7 +1022,7 @@
           <a:p>
             <a:fld id="{EF4EFFAA-60B0-4C50-B06F-B9907E49371C}" type="datetimeFigureOut">
               <a:rPr lang="fr-FR" smtClean="0"/>
-              <a:t>15/01/2015</a:t>
+              <a:t>20/01/2015</a:t>
             </a:fld>
             <a:endParaRPr lang="fr-FR"/>
           </a:p>
@@ -1048,7 +1064,7 @@
           <a:p>
             <a:fld id="{5B183991-99AC-48B7-9B64-76956455EBB2}" type="slidenum">
               <a:rPr lang="fr-FR" smtClean="0"/>
-              <a:t>‹#›</a:t>
+              <a:t>‹N°›</a:t>
             </a:fld>
             <a:endParaRPr lang="fr-FR"/>
           </a:p>
@@ -1238,7 +1254,7 @@
           <a:p>
             <a:fld id="{EF4EFFAA-60B0-4C50-B06F-B9907E49371C}" type="datetimeFigureOut">
               <a:rPr lang="fr-FR" smtClean="0"/>
-              <a:t>15/01/2015</a:t>
+              <a:t>20/01/2015</a:t>
             </a:fld>
             <a:endParaRPr lang="fr-FR"/>
           </a:p>
@@ -1280,7 +1296,7 @@
           <a:p>
             <a:fld id="{5B183991-99AC-48B7-9B64-76956455EBB2}" type="slidenum">
               <a:rPr lang="fr-FR" smtClean="0"/>
-              <a:t>‹#›</a:t>
+              <a:t>‹N°›</a:t>
             </a:fld>
             <a:endParaRPr lang="fr-FR"/>
           </a:p>
@@ -1605,7 +1621,7 @@
           <a:p>
             <a:fld id="{EF4EFFAA-60B0-4C50-B06F-B9907E49371C}" type="datetimeFigureOut">
               <a:rPr lang="fr-FR" smtClean="0"/>
-              <a:t>15/01/2015</a:t>
+              <a:t>20/01/2015</a:t>
             </a:fld>
             <a:endParaRPr lang="fr-FR"/>
           </a:p>
@@ -1647,7 +1663,7 @@
           <a:p>
             <a:fld id="{5B183991-99AC-48B7-9B64-76956455EBB2}" type="slidenum">
               <a:rPr lang="fr-FR" smtClean="0"/>
-              <a:t>‹#›</a:t>
+              <a:t>‹N°›</a:t>
             </a:fld>
             <a:endParaRPr lang="fr-FR"/>
           </a:p>
@@ -1723,7 +1739,7 @@
           <a:p>
             <a:fld id="{EF4EFFAA-60B0-4C50-B06F-B9907E49371C}" type="datetimeFigureOut">
               <a:rPr lang="fr-FR" smtClean="0"/>
-              <a:t>15/01/2015</a:t>
+              <a:t>20/01/2015</a:t>
             </a:fld>
             <a:endParaRPr lang="fr-FR"/>
           </a:p>
@@ -1765,7 +1781,7 @@
           <a:p>
             <a:fld id="{5B183991-99AC-48B7-9B64-76956455EBB2}" type="slidenum">
               <a:rPr lang="fr-FR" smtClean="0"/>
-              <a:t>‹#›</a:t>
+              <a:t>‹N°›</a:t>
             </a:fld>
             <a:endParaRPr lang="fr-FR"/>
           </a:p>
@@ -1818,7 +1834,7 @@
           <a:p>
             <a:fld id="{EF4EFFAA-60B0-4C50-B06F-B9907E49371C}" type="datetimeFigureOut">
               <a:rPr lang="fr-FR" smtClean="0"/>
-              <a:t>15/01/2015</a:t>
+              <a:t>20/01/2015</a:t>
             </a:fld>
             <a:endParaRPr lang="fr-FR"/>
           </a:p>
@@ -1860,7 +1876,7 @@
           <a:p>
             <a:fld id="{5B183991-99AC-48B7-9B64-76956455EBB2}" type="slidenum">
               <a:rPr lang="fr-FR" smtClean="0"/>
-              <a:t>‹#›</a:t>
+              <a:t>‹N°›</a:t>
             </a:fld>
             <a:endParaRPr lang="fr-FR"/>
           </a:p>
@@ -2095,7 +2111,7 @@
           <a:p>
             <a:fld id="{EF4EFFAA-60B0-4C50-B06F-B9907E49371C}" type="datetimeFigureOut">
               <a:rPr lang="fr-FR" smtClean="0"/>
-              <a:t>15/01/2015</a:t>
+              <a:t>20/01/2015</a:t>
             </a:fld>
             <a:endParaRPr lang="fr-FR"/>
           </a:p>
@@ -2137,7 +2153,7 @@
           <a:p>
             <a:fld id="{5B183991-99AC-48B7-9B64-76956455EBB2}" type="slidenum">
               <a:rPr lang="fr-FR" smtClean="0"/>
-              <a:t>‹#›</a:t>
+              <a:t>‹N°›</a:t>
             </a:fld>
             <a:endParaRPr lang="fr-FR"/>
           </a:p>
@@ -2348,7 +2364,7 @@
           <a:p>
             <a:fld id="{EF4EFFAA-60B0-4C50-B06F-B9907E49371C}" type="datetimeFigureOut">
               <a:rPr lang="fr-FR" smtClean="0"/>
-              <a:t>15/01/2015</a:t>
+              <a:t>20/01/2015</a:t>
             </a:fld>
             <a:endParaRPr lang="fr-FR"/>
           </a:p>
@@ -2390,7 +2406,7 @@
           <a:p>
             <a:fld id="{5B183991-99AC-48B7-9B64-76956455EBB2}" type="slidenum">
               <a:rPr lang="fr-FR" smtClean="0"/>
-              <a:t>‹#›</a:t>
+              <a:t>‹N°›</a:t>
             </a:fld>
             <a:endParaRPr lang="fr-FR"/>
           </a:p>
@@ -2561,7 +2577,7 @@
           <a:p>
             <a:fld id="{EF4EFFAA-60B0-4C50-B06F-B9907E49371C}" type="datetimeFigureOut">
               <a:rPr lang="fr-FR" smtClean="0"/>
-              <a:t>15/01/2015</a:t>
+              <a:t>20/01/2015</a:t>
             </a:fld>
             <a:endParaRPr lang="fr-FR"/>
           </a:p>
@@ -2639,7 +2655,7 @@
           <a:p>
             <a:fld id="{5B183991-99AC-48B7-9B64-76956455EBB2}" type="slidenum">
               <a:rPr lang="fr-FR" smtClean="0"/>
-              <a:t>‹#›</a:t>
+              <a:t>‹N°›</a:t>
             </a:fld>
             <a:endParaRPr lang="fr-FR"/>
           </a:p>
@@ -5249,20 +5265,7 @@
                       </a:outerShdw>
                     </a:effectLst>
                   </a:rPr>
-                  <a:t>Joueur </a:t>
-                </a:r>
-                <a:r>
-                  <a:rPr lang="fr-FR" sz="2000" dirty="0" smtClean="0">
-                    <a:ln w="0"/>
-                    <a:effectLst>
-                      <a:outerShdw blurRad="38100" dist="19050" dir="2700000" algn="tl" rotWithShape="0">
-                        <a:schemeClr val="dk1">
-                          <a:alpha val="40000"/>
-                        </a:schemeClr>
-                      </a:outerShdw>
-                    </a:effectLst>
-                  </a:rPr>
-                  <a:t>(Interface commande humain ou IA)</a:t>
+                  <a:t>Joueur (Interface commande humain ou IA)</a:t>
                 </a:r>
                 <a:endParaRPr lang="fr-FR" sz="2000" b="0" cap="none" spc="0" dirty="0">
                   <a:ln w="0"/>
@@ -6815,7 +6818,7 @@
         <p:spPr>
           <a:xfrm>
             <a:off x="4620211" y="2771054"/>
-            <a:ext cx="1210588" cy="307777"/>
+            <a:ext cx="1845826" cy="523220"/>
           </a:xfrm>
           <a:prstGeom prst="rect">
             <a:avLst/>
@@ -6830,15 +6833,14 @@
           <a:p>
             <a:r>
               <a:rPr lang="fr-FR" sz="1400" dirty="0" err="1" smtClean="0"/>
-              <a:t>Duree</a:t>
+              <a:t>dureeDeVie</a:t>
             </a:r>
+            <a:endParaRPr lang="fr-FR" sz="1400" dirty="0" smtClean="0"/>
+          </a:p>
+          <a:p>
             <a:r>
-              <a:rPr lang="fr-FR" sz="1400" dirty="0" err="1"/>
-              <a:t>_</a:t>
-            </a:r>
-            <a:r>
-              <a:rPr lang="fr-FR" sz="1400" dirty="0" err="1" smtClean="0"/>
-              <a:t>de_vie</a:t>
+              <a:rPr lang="fr-FR" sz="1400" dirty="0" smtClean="0"/>
+              <a:t>Etat posé explosion KO</a:t>
             </a:r>
             <a:endParaRPr lang="fr-FR" sz="1400" dirty="0"/>
           </a:p>
@@ -8227,11 +8229,7 @@
           <a:p>
             <a:r>
               <a:rPr lang="fr-FR" dirty="0" smtClean="0"/>
-              <a:t>Création </a:t>
-            </a:r>
-            <a:r>
-              <a:rPr lang="fr-FR" dirty="0" smtClean="0"/>
-              <a:t>bombe</a:t>
+              <a:t>Création bombe</a:t>
             </a:r>
             <a:endParaRPr lang="fr-FR" dirty="0"/>
           </a:p>
@@ -9071,7 +9069,7 @@
   <a:extraClrSchemeLst/>
   <a:extLst>
     <a:ext uri="{05A4C25C-085E-4340-85A3-A5531E510DB2}">
-      <thm15:themeFamily xmlns:thm15="http://schemas.microsoft.com/office/thememl/2012/main" xmlns="" name="Office Theme" id="{62F939B6-93AF-4DB8-9C6B-D6C7DFDC589F}" vid="{4A3C46E8-61CC-4603-A589-7422A47A8E4A}"/>
+      <thm15:themeFamily xmlns:thm15="http://schemas.microsoft.com/office/thememl/2012/main" name="Office Theme" id="{62F939B6-93AF-4DB8-9C6B-D6C7DFDC589F}" vid="{4A3C46E8-61CC-4603-A589-7422A47A8E4A}"/>
     </a:ext>
   </a:extLst>
 </a:theme>

</xml_diff>